<commit_message>
Final Power point presentation
</commit_message>
<xml_diff>
--- a/Tracking Detector.pptx
+++ b/Tracking Detector.pptx
@@ -8,6 +8,7 @@
     <p:sldId id="256" r:id="rId2"/>
     <p:sldId id="257" r:id="rId3"/>
     <p:sldId id="258" r:id="rId4"/>
+    <p:sldId id="259" r:id="rId5"/>
   </p:sldIdLst>
   <p:sldSz cx="12192000" cy="6858000"/>
   <p:notesSz cx="6858000" cy="9144000"/>
@@ -106,6 +107,11 @@
       </a:defRPr>
     </a:lvl9pPr>
   </p:defaultTextStyle>
+  <p:extLst>
+    <p:ext uri="{EFAFB233-063F-42B5-8137-9DF3F51BA10A}">
+      <p15:sldGuideLst xmlns:p15="http://schemas.microsoft.com/office/powerpoint/2012/main"/>
+    </p:ext>
+  </p:extLst>
 </p:presentation>
 </file>
 
@@ -258,7 +264,7 @@
           <a:p>
             <a:fld id="{A9F3E06A-9DE1-4813-8959-4B420EDDB8FE}" type="datetimeFigureOut">
               <a:rPr lang="de-CH" smtClean="0"/>
-              <a:t>24.04.2025</a:t>
+              <a:t>29.04.2025</a:t>
             </a:fld>
             <a:endParaRPr lang="de-CH"/>
           </a:p>
@@ -458,7 +464,7 @@
           <a:p>
             <a:fld id="{A9F3E06A-9DE1-4813-8959-4B420EDDB8FE}" type="datetimeFigureOut">
               <a:rPr lang="de-CH" smtClean="0"/>
-              <a:t>24.04.2025</a:t>
+              <a:t>29.04.2025</a:t>
             </a:fld>
             <a:endParaRPr lang="de-CH"/>
           </a:p>
@@ -668,7 +674,7 @@
           <a:p>
             <a:fld id="{A9F3E06A-9DE1-4813-8959-4B420EDDB8FE}" type="datetimeFigureOut">
               <a:rPr lang="de-CH" smtClean="0"/>
-              <a:t>24.04.2025</a:t>
+              <a:t>29.04.2025</a:t>
             </a:fld>
             <a:endParaRPr lang="de-CH"/>
           </a:p>
@@ -868,7 +874,7 @@
           <a:p>
             <a:fld id="{A9F3E06A-9DE1-4813-8959-4B420EDDB8FE}" type="datetimeFigureOut">
               <a:rPr lang="de-CH" smtClean="0"/>
-              <a:t>24.04.2025</a:t>
+              <a:t>29.04.2025</a:t>
             </a:fld>
             <a:endParaRPr lang="de-CH"/>
           </a:p>
@@ -1144,7 +1150,7 @@
           <a:p>
             <a:fld id="{A9F3E06A-9DE1-4813-8959-4B420EDDB8FE}" type="datetimeFigureOut">
               <a:rPr lang="de-CH" smtClean="0"/>
-              <a:t>24.04.2025</a:t>
+              <a:t>29.04.2025</a:t>
             </a:fld>
             <a:endParaRPr lang="de-CH"/>
           </a:p>
@@ -1412,7 +1418,7 @@
           <a:p>
             <a:fld id="{A9F3E06A-9DE1-4813-8959-4B420EDDB8FE}" type="datetimeFigureOut">
               <a:rPr lang="de-CH" smtClean="0"/>
-              <a:t>24.04.2025</a:t>
+              <a:t>29.04.2025</a:t>
             </a:fld>
             <a:endParaRPr lang="de-CH"/>
           </a:p>
@@ -1827,7 +1833,7 @@
           <a:p>
             <a:fld id="{A9F3E06A-9DE1-4813-8959-4B420EDDB8FE}" type="datetimeFigureOut">
               <a:rPr lang="de-CH" smtClean="0"/>
-              <a:t>24.04.2025</a:t>
+              <a:t>29.04.2025</a:t>
             </a:fld>
             <a:endParaRPr lang="de-CH"/>
           </a:p>
@@ -1969,7 +1975,7 @@
           <a:p>
             <a:fld id="{A9F3E06A-9DE1-4813-8959-4B420EDDB8FE}" type="datetimeFigureOut">
               <a:rPr lang="de-CH" smtClean="0"/>
-              <a:t>24.04.2025</a:t>
+              <a:t>29.04.2025</a:t>
             </a:fld>
             <a:endParaRPr lang="de-CH"/>
           </a:p>
@@ -2082,7 +2088,7 @@
           <a:p>
             <a:fld id="{A9F3E06A-9DE1-4813-8959-4B420EDDB8FE}" type="datetimeFigureOut">
               <a:rPr lang="de-CH" smtClean="0"/>
-              <a:t>24.04.2025</a:t>
+              <a:t>29.04.2025</a:t>
             </a:fld>
             <a:endParaRPr lang="de-CH"/>
           </a:p>
@@ -2395,7 +2401,7 @@
           <a:p>
             <a:fld id="{A9F3E06A-9DE1-4813-8959-4B420EDDB8FE}" type="datetimeFigureOut">
               <a:rPr lang="de-CH" smtClean="0"/>
-              <a:t>24.04.2025</a:t>
+              <a:t>29.04.2025</a:t>
             </a:fld>
             <a:endParaRPr lang="de-CH"/>
           </a:p>
@@ -2684,7 +2690,7 @@
           <a:p>
             <a:fld id="{A9F3E06A-9DE1-4813-8959-4B420EDDB8FE}" type="datetimeFigureOut">
               <a:rPr lang="de-CH" smtClean="0"/>
-              <a:t>24.04.2025</a:t>
+              <a:t>29.04.2025</a:t>
             </a:fld>
             <a:endParaRPr lang="de-CH"/>
           </a:p>
@@ -2927,7 +2933,7 @@
           <a:p>
             <a:fld id="{A9F3E06A-9DE1-4813-8959-4B420EDDB8FE}" type="datetimeFigureOut">
               <a:rPr lang="de-CH" smtClean="0"/>
-              <a:t>24.04.2025</a:t>
+              <a:t>29.04.2025</a:t>
             </a:fld>
             <a:endParaRPr lang="de-CH"/>
           </a:p>
@@ -4263,6 +4269,470 @@
     <p:extLst>
       <p:ext uri="{BB962C8B-B14F-4D97-AF65-F5344CB8AC3E}">
         <p14:creationId xmlns:p14="http://schemas.microsoft.com/office/powerpoint/2010/main" val="3314605771"/>
+      </p:ext>
+    </p:extLst>
+  </p:cSld>
+  <p:clrMapOvr>
+    <a:masterClrMapping/>
+  </p:clrMapOvr>
+</p:sld>
+</file>
+
+<file path=ppt/slides/slide4.xml><?xml version="1.0" encoding="utf-8"?>
+<p:sld xmlns:a="http://schemas.openxmlformats.org/drawingml/2006/main" xmlns:r="http://schemas.openxmlformats.org/officeDocument/2006/relationships" xmlns:p="http://schemas.openxmlformats.org/presentationml/2006/main">
+  <p:cSld>
+    <p:bg>
+      <p:bgPr>
+        <a:solidFill>
+          <a:schemeClr val="bg1"/>
+        </a:solidFill>
+        <a:effectLst/>
+      </p:bgPr>
+    </p:bg>
+    <p:spTree>
+      <p:nvGrpSpPr>
+        <p:cNvPr id="1" name=""/>
+        <p:cNvGrpSpPr/>
+        <p:nvPr/>
+      </p:nvGrpSpPr>
+      <p:grpSpPr>
+        <a:xfrm>
+          <a:off x="0" y="0"/>
+          <a:ext cx="0" cy="0"/>
+          <a:chOff x="0" y="0"/>
+          <a:chExt cx="0" cy="0"/>
+        </a:xfrm>
+      </p:grpSpPr>
+      <p:sp useBgFill="1">
+        <p:nvSpPr>
+          <p:cNvPr id="11" name="Rectangle 10">
+            <a:extLst>
+              <a:ext uri="{FF2B5EF4-FFF2-40B4-BE49-F238E27FC236}">
+                <a16:creationId xmlns:a16="http://schemas.microsoft.com/office/drawing/2014/main" id="{A8384FB5-9ADC-4DDC-881B-597D56F5B15D}"/>
+              </a:ext>
+              <a:ext uri="{C183D7F6-B498-43B3-948B-1728B52AA6E4}">
+                <adec:decorative xmlns:adec="http://schemas.microsoft.com/office/drawing/2017/decorative" val="1"/>
+              </a:ext>
+            </a:extLst>
+          </p:cNvPr>
+          <p:cNvSpPr>
+            <a:spLocks noGrp="1" noRot="1" noChangeAspect="1" noMove="1" noResize="1" noEditPoints="1" noAdjustHandles="1" noChangeArrowheads="1" noChangeShapeType="1" noTextEdit="1"/>
+          </p:cNvSpPr>
+          <p:nvPr>
+            <p:extLst>
+              <p:ext uri="{386F3935-93C4-4BCD-93E2-E3B085C9AB24}">
+                <p16:designElem xmlns:p16="http://schemas.microsoft.com/office/powerpoint/2015/main" val="1"/>
+              </p:ext>
+            </p:extLst>
+          </p:nvPr>
+        </p:nvSpPr>
+        <p:spPr>
+          <a:xfrm>
+            <a:off x="0" y="0"/>
+            <a:ext cx="12192000" cy="6858000"/>
+          </a:xfrm>
+          <a:prstGeom prst="rect">
+            <a:avLst/>
+          </a:prstGeom>
+          <a:ln w="12700" cap="flat" cmpd="sng" algn="ctr">
+            <a:noFill/>
+            <a:prstDash val="solid"/>
+            <a:miter lim="800000"/>
+          </a:ln>
+          <a:effectLst/>
+          <a:extLst>
+            <a:ext uri="{91240B29-F687-4F45-9708-019B960494DF}">
+              <a14:hiddenLine xmlns:a14="http://schemas.microsoft.com/office/drawing/2010/main" w="12700" cap="flat" cmpd="sng" algn="ctr">
+                <a:solidFill>
+                  <a:schemeClr val="accent1">
+                    <a:shade val="50000"/>
+                  </a:schemeClr>
+                </a:solidFill>
+                <a:prstDash val="solid"/>
+                <a:miter lim="800000"/>
+              </a14:hiddenLine>
+            </a:ext>
+          </a:extLst>
+        </p:spPr>
+        <p:style>
+          <a:lnRef idx="2">
+            <a:schemeClr val="accent1">
+              <a:shade val="50000"/>
+            </a:schemeClr>
+          </a:lnRef>
+          <a:fillRef idx="1">
+            <a:schemeClr val="accent1"/>
+          </a:fillRef>
+          <a:effectRef idx="0">
+            <a:schemeClr val="accent1"/>
+          </a:effectRef>
+          <a:fontRef idx="minor">
+            <a:schemeClr val="lt1"/>
+          </a:fontRef>
+        </p:style>
+        <p:txBody>
+          <a:bodyPr rtlCol="0" anchor="ctr"/>
+          <a:lstStyle/>
+          <a:p>
+            <a:pPr algn="ctr"/>
+            <a:endParaRPr lang="en-US"/>
+          </a:p>
+        </p:txBody>
+      </p:sp>
+      <p:sp>
+        <p:nvSpPr>
+          <p:cNvPr id="13" name="Rectangle 12">
+            <a:extLst>
+              <a:ext uri="{FF2B5EF4-FFF2-40B4-BE49-F238E27FC236}">
+                <a16:creationId xmlns:a16="http://schemas.microsoft.com/office/drawing/2014/main" id="{1199E1B1-A8C0-4FE8-A5A8-1CB41D69F857}"/>
+              </a:ext>
+              <a:ext uri="{C183D7F6-B498-43B3-948B-1728B52AA6E4}">
+                <adec:decorative xmlns:adec="http://schemas.microsoft.com/office/drawing/2017/decorative" val="1"/>
+              </a:ext>
+            </a:extLst>
+          </p:cNvPr>
+          <p:cNvSpPr>
+            <a:spLocks noGrp="1" noRot="1" noChangeAspect="1" noMove="1" noResize="1" noEditPoints="1" noAdjustHandles="1" noChangeArrowheads="1" noChangeShapeType="1" noTextEdit="1"/>
+          </p:cNvSpPr>
+          <p:nvPr>
+            <p:extLst>
+              <p:ext uri="{386F3935-93C4-4BCD-93E2-E3B085C9AB24}">
+                <p16:designElem xmlns:p16="http://schemas.microsoft.com/office/powerpoint/2015/main" val="1"/>
+              </p:ext>
+            </p:extLst>
+          </p:nvPr>
+        </p:nvSpPr>
+        <p:spPr>
+          <a:xfrm rot="10800000" flipH="1">
+            <a:off x="2" y="0"/>
+            <a:ext cx="12191998" cy="1575955"/>
+          </a:xfrm>
+          <a:prstGeom prst="rect">
+            <a:avLst/>
+          </a:prstGeom>
+          <a:gradFill>
+            <a:gsLst>
+              <a:gs pos="0">
+                <a:srgbClr val="000000">
+                  <a:alpha val="96000"/>
+                </a:srgbClr>
+              </a:gs>
+              <a:gs pos="100000">
+                <a:schemeClr val="accent1">
+                  <a:lumMod val="75000"/>
+                </a:schemeClr>
+              </a:gs>
+            </a:gsLst>
+            <a:lin ang="6000000" scaled="0"/>
+          </a:gradFill>
+          <a:ln>
+            <a:noFill/>
+          </a:ln>
+        </p:spPr>
+        <p:style>
+          <a:lnRef idx="2">
+            <a:schemeClr val="accent1">
+              <a:shade val="50000"/>
+            </a:schemeClr>
+          </a:lnRef>
+          <a:fillRef idx="1">
+            <a:schemeClr val="accent1"/>
+          </a:fillRef>
+          <a:effectRef idx="0">
+            <a:schemeClr val="accent1"/>
+          </a:effectRef>
+          <a:fontRef idx="minor">
+            <a:schemeClr val="lt1"/>
+          </a:fontRef>
+        </p:style>
+        <p:txBody>
+          <a:bodyPr rtlCol="0" anchor="ctr"/>
+          <a:lstStyle/>
+          <a:p>
+            <a:pPr algn="ctr"/>
+            <a:endParaRPr lang="en-US"/>
+          </a:p>
+        </p:txBody>
+      </p:sp>
+      <p:sp>
+        <p:nvSpPr>
+          <p:cNvPr id="15" name="Rectangle 14">
+            <a:extLst>
+              <a:ext uri="{FF2B5EF4-FFF2-40B4-BE49-F238E27FC236}">
+                <a16:creationId xmlns:a16="http://schemas.microsoft.com/office/drawing/2014/main" id="{84A8DE83-DE75-4B41-9DB4-A7EC0B0DEC0B}"/>
+              </a:ext>
+              <a:ext uri="{C183D7F6-B498-43B3-948B-1728B52AA6E4}">
+                <adec:decorative xmlns:adec="http://schemas.microsoft.com/office/drawing/2017/decorative" val="1"/>
+              </a:ext>
+            </a:extLst>
+          </p:cNvPr>
+          <p:cNvSpPr>
+            <a:spLocks noGrp="1" noRot="1" noChangeAspect="1" noMove="1" noResize="1" noEditPoints="1" noAdjustHandles="1" noChangeArrowheads="1" noChangeShapeType="1" noTextEdit="1"/>
+          </p:cNvSpPr>
+          <p:nvPr>
+            <p:extLst>
+              <p:ext uri="{386F3935-93C4-4BCD-93E2-E3B085C9AB24}">
+                <p16:designElem xmlns:p16="http://schemas.microsoft.com/office/powerpoint/2015/main" val="1"/>
+              </p:ext>
+            </p:extLst>
+          </p:nvPr>
+        </p:nvSpPr>
+        <p:spPr>
+          <a:xfrm>
+            <a:off x="0" y="0"/>
+            <a:ext cx="8128856" cy="1575461"/>
+          </a:xfrm>
+          <a:prstGeom prst="rect">
+            <a:avLst/>
+          </a:prstGeom>
+          <a:gradFill>
+            <a:gsLst>
+              <a:gs pos="0">
+                <a:schemeClr val="accent1">
+                  <a:alpha val="41000"/>
+                </a:schemeClr>
+              </a:gs>
+              <a:gs pos="74000">
+                <a:schemeClr val="accent1">
+                  <a:lumMod val="60000"/>
+                  <a:lumOff val="40000"/>
+                  <a:alpha val="0"/>
+                </a:schemeClr>
+              </a:gs>
+            </a:gsLst>
+            <a:lin ang="8400000" scaled="0"/>
+          </a:gradFill>
+          <a:ln>
+            <a:noFill/>
+          </a:ln>
+        </p:spPr>
+        <p:style>
+          <a:lnRef idx="2">
+            <a:schemeClr val="accent1">
+              <a:shade val="50000"/>
+            </a:schemeClr>
+          </a:lnRef>
+          <a:fillRef idx="1">
+            <a:schemeClr val="accent1"/>
+          </a:fillRef>
+          <a:effectRef idx="0">
+            <a:schemeClr val="accent1"/>
+          </a:effectRef>
+          <a:fontRef idx="minor">
+            <a:schemeClr val="lt1"/>
+          </a:fontRef>
+        </p:style>
+        <p:txBody>
+          <a:bodyPr rtlCol="0" anchor="ctr"/>
+          <a:lstStyle/>
+          <a:p>
+            <a:pPr algn="ctr"/>
+            <a:endParaRPr lang="en-US"/>
+          </a:p>
+        </p:txBody>
+      </p:sp>
+      <p:sp>
+        <p:nvSpPr>
+          <p:cNvPr id="17" name="Rectangle 16">
+            <a:extLst>
+              <a:ext uri="{FF2B5EF4-FFF2-40B4-BE49-F238E27FC236}">
+                <a16:creationId xmlns:a16="http://schemas.microsoft.com/office/drawing/2014/main" id="{A7009A0A-BEF5-4EAC-AF15-E4F9F002E239}"/>
+              </a:ext>
+              <a:ext uri="{C183D7F6-B498-43B3-948B-1728B52AA6E4}">
+                <adec:decorative xmlns:adec="http://schemas.microsoft.com/office/drawing/2017/decorative" val="1"/>
+              </a:ext>
+            </a:extLst>
+          </p:cNvPr>
+          <p:cNvSpPr>
+            <a:spLocks noGrp="1" noRot="1" noChangeAspect="1" noMove="1" noResize="1" noEditPoints="1" noAdjustHandles="1" noChangeArrowheads="1" noChangeShapeType="1" noTextEdit="1"/>
+          </p:cNvSpPr>
+          <p:nvPr>
+            <p:extLst>
+              <p:ext uri="{386F3935-93C4-4BCD-93E2-E3B085C9AB24}">
+                <p16:designElem xmlns:p16="http://schemas.microsoft.com/office/powerpoint/2015/main" val="1"/>
+              </p:ext>
+            </p:extLst>
+          </p:nvPr>
+        </p:nvSpPr>
+        <p:spPr>
+          <a:xfrm flipH="1">
+            <a:off x="-3" y="-1"/>
+            <a:ext cx="12192002" cy="1574311"/>
+          </a:xfrm>
+          <a:prstGeom prst="rect">
+            <a:avLst/>
+          </a:prstGeom>
+          <a:gradFill>
+            <a:gsLst>
+              <a:gs pos="0">
+                <a:srgbClr val="000000">
+                  <a:alpha val="63000"/>
+                </a:srgbClr>
+              </a:gs>
+              <a:gs pos="78000">
+                <a:schemeClr val="accent1">
+                  <a:alpha val="15000"/>
+                </a:schemeClr>
+              </a:gs>
+            </a:gsLst>
+            <a:lin ang="15600000" scaled="0"/>
+          </a:gradFill>
+          <a:ln>
+            <a:noFill/>
+          </a:ln>
+        </p:spPr>
+        <p:style>
+          <a:lnRef idx="2">
+            <a:schemeClr val="accent1">
+              <a:shade val="50000"/>
+            </a:schemeClr>
+          </a:lnRef>
+          <a:fillRef idx="1">
+            <a:schemeClr val="accent1"/>
+          </a:fillRef>
+          <a:effectRef idx="0">
+            <a:schemeClr val="accent1"/>
+          </a:effectRef>
+          <a:fontRef idx="minor">
+            <a:schemeClr val="lt1"/>
+          </a:fontRef>
+        </p:style>
+        <p:txBody>
+          <a:bodyPr rtlCol="0" anchor="ctr"/>
+          <a:lstStyle/>
+          <a:p>
+            <a:pPr algn="ctr"/>
+            <a:endParaRPr lang="en-US"/>
+          </a:p>
+        </p:txBody>
+      </p:sp>
+      <p:sp>
+        <p:nvSpPr>
+          <p:cNvPr id="2" name="Titel 1">
+            <a:extLst>
+              <a:ext uri="{FF2B5EF4-FFF2-40B4-BE49-F238E27FC236}">
+                <a16:creationId xmlns:a16="http://schemas.microsoft.com/office/drawing/2014/main" id="{FD3DDEAA-C26B-3F42-C042-A6621685CC2B}"/>
+              </a:ext>
+            </a:extLst>
+          </p:cNvPr>
+          <p:cNvSpPr>
+            <a:spLocks noGrp="1"/>
+          </p:cNvSpPr>
+          <p:nvPr>
+            <p:ph type="title"/>
+          </p:nvPr>
+        </p:nvSpPr>
+        <p:spPr>
+          <a:xfrm>
+            <a:off x="699713" y="248038"/>
+            <a:ext cx="7063721" cy="1159200"/>
+          </a:xfrm>
+        </p:spPr>
+        <p:txBody>
+          <a:bodyPr vert="horz" lIns="91440" tIns="45720" rIns="91440" bIns="45720" rtlCol="0" anchor="ctr">
+            <a:normAutofit/>
+          </a:bodyPr>
+          <a:lstStyle/>
+          <a:p>
+            <a:r>
+              <a:rPr lang="en-US" sz="4000" kern="1200">
+                <a:solidFill>
+                  <a:srgbClr val="FFFFFF"/>
+                </a:solidFill>
+                <a:latin typeface="+mj-lt"/>
+                <a:ea typeface="+mj-ea"/>
+                <a:cs typeface="+mj-cs"/>
+              </a:rPr>
+              <a:t>Momentum resolution</a:t>
+            </a:r>
+          </a:p>
+        </p:txBody>
+      </p:sp>
+      <p:sp>
+        <p:nvSpPr>
+          <p:cNvPr id="6" name="Textfeld 5">
+            <a:extLst>
+              <a:ext uri="{FF2B5EF4-FFF2-40B4-BE49-F238E27FC236}">
+                <a16:creationId xmlns:a16="http://schemas.microsoft.com/office/drawing/2014/main" id="{32F0C225-47F4-8419-3B60-0AB293A1FB66}"/>
+              </a:ext>
+            </a:extLst>
+          </p:cNvPr>
+          <p:cNvSpPr txBox="1"/>
+          <p:nvPr/>
+        </p:nvSpPr>
+        <p:spPr>
+          <a:xfrm>
+            <a:off x="8572499" y="390832"/>
+            <a:ext cx="3233585" cy="873612"/>
+          </a:xfrm>
+          <a:prstGeom prst="rect">
+            <a:avLst/>
+          </a:prstGeom>
+        </p:spPr>
+        <p:txBody>
+          <a:bodyPr vert="horz" lIns="91440" tIns="45720" rIns="91440" bIns="45720" rtlCol="0" anchor="ctr">
+            <a:normAutofit/>
+          </a:bodyPr>
+          <a:lstStyle/>
+          <a:p>
+            <a:pPr>
+              <a:lnSpc>
+                <a:spcPct val="90000"/>
+              </a:lnSpc>
+              <a:spcBef>
+                <a:spcPts val="1000"/>
+              </a:spcBef>
+            </a:pPr>
+            <a:r>
+              <a:rPr lang="en-US" sz="2000" kern="1200">
+                <a:solidFill>
+                  <a:srgbClr val="FFFFFF"/>
+                </a:solidFill>
+                <a:latin typeface="+mn-lt"/>
+                <a:ea typeface="+mn-ea"/>
+                <a:cs typeface="+mn-cs"/>
+              </a:rPr>
+              <a:t>Multiple trajectories</a:t>
+            </a:r>
+          </a:p>
+        </p:txBody>
+      </p:sp>
+      <p:pic>
+        <p:nvPicPr>
+          <p:cNvPr id="5" name="Inhaltsplatzhalter 4">
+            <a:extLst>
+              <a:ext uri="{FF2B5EF4-FFF2-40B4-BE49-F238E27FC236}">
+                <a16:creationId xmlns:a16="http://schemas.microsoft.com/office/drawing/2014/main" id="{F0049F80-2DC1-BF79-D97E-1650CF575487}"/>
+              </a:ext>
+            </a:extLst>
+          </p:cNvPr>
+          <p:cNvPicPr>
+            <a:picLocks noGrp="1" noChangeAspect="1"/>
+          </p:cNvPicPr>
+          <p:nvPr>
+            <p:ph idx="1"/>
+          </p:nvPr>
+        </p:nvPicPr>
+        <p:blipFill>
+          <a:blip r:embed="rId2"/>
+          <a:stretch>
+            <a:fillRect/>
+          </a:stretch>
+        </p:blipFill>
+        <p:spPr>
+          <a:xfrm>
+            <a:off x="1458333" y="1966293"/>
+            <a:ext cx="9275332" cy="4452160"/>
+          </a:xfrm>
+          <a:prstGeom prst="rect">
+            <a:avLst/>
+          </a:prstGeom>
+        </p:spPr>
+      </p:pic>
+    </p:spTree>
+    <p:extLst>
+      <p:ext uri="{BB962C8B-B14F-4D97-AF65-F5344CB8AC3E}">
+        <p14:creationId xmlns:p14="http://schemas.microsoft.com/office/powerpoint/2010/main" val="154335484"/>
       </p:ext>
     </p:extLst>
   </p:cSld>

</xml_diff>